<commit_message>
Login, register and reset password guis implemented
</commit_message>
<xml_diff>
--- a/GanzShonClever_plan.pptx
+++ b/GanzShonClever_plan.pptx
@@ -273,7 +273,7 @@
           <a:p>
             <a:fld id="{65735663-AB37-4784-894E-DAAE42030DBB}" type="datetimeFigureOut">
               <a:rPr lang="en-GB" smtClean="0"/>
-              <a:t>05/04/2022</a:t>
+              <a:t>06/04/2022</a:t>
             </a:fld>
             <a:endParaRPr lang="en-GB"/>
           </a:p>
@@ -473,7 +473,7 @@
           <a:p>
             <a:fld id="{65735663-AB37-4784-894E-DAAE42030DBB}" type="datetimeFigureOut">
               <a:rPr lang="en-GB" smtClean="0"/>
-              <a:t>05/04/2022</a:t>
+              <a:t>06/04/2022</a:t>
             </a:fld>
             <a:endParaRPr lang="en-GB"/>
           </a:p>
@@ -683,7 +683,7 @@
           <a:p>
             <a:fld id="{65735663-AB37-4784-894E-DAAE42030DBB}" type="datetimeFigureOut">
               <a:rPr lang="en-GB" smtClean="0"/>
-              <a:t>05/04/2022</a:t>
+              <a:t>06/04/2022</a:t>
             </a:fld>
             <a:endParaRPr lang="en-GB"/>
           </a:p>
@@ -883,7 +883,7 @@
           <a:p>
             <a:fld id="{65735663-AB37-4784-894E-DAAE42030DBB}" type="datetimeFigureOut">
               <a:rPr lang="en-GB" smtClean="0"/>
-              <a:t>05/04/2022</a:t>
+              <a:t>06/04/2022</a:t>
             </a:fld>
             <a:endParaRPr lang="en-GB"/>
           </a:p>
@@ -1159,7 +1159,7 @@
           <a:p>
             <a:fld id="{65735663-AB37-4784-894E-DAAE42030DBB}" type="datetimeFigureOut">
               <a:rPr lang="en-GB" smtClean="0"/>
-              <a:t>05/04/2022</a:t>
+              <a:t>06/04/2022</a:t>
             </a:fld>
             <a:endParaRPr lang="en-GB"/>
           </a:p>
@@ -1427,7 +1427,7 @@
           <a:p>
             <a:fld id="{65735663-AB37-4784-894E-DAAE42030DBB}" type="datetimeFigureOut">
               <a:rPr lang="en-GB" smtClean="0"/>
-              <a:t>05/04/2022</a:t>
+              <a:t>06/04/2022</a:t>
             </a:fld>
             <a:endParaRPr lang="en-GB"/>
           </a:p>
@@ -1842,7 +1842,7 @@
           <a:p>
             <a:fld id="{65735663-AB37-4784-894E-DAAE42030DBB}" type="datetimeFigureOut">
               <a:rPr lang="en-GB" smtClean="0"/>
-              <a:t>05/04/2022</a:t>
+              <a:t>06/04/2022</a:t>
             </a:fld>
             <a:endParaRPr lang="en-GB"/>
           </a:p>
@@ -1984,7 +1984,7 @@
           <a:p>
             <a:fld id="{65735663-AB37-4784-894E-DAAE42030DBB}" type="datetimeFigureOut">
               <a:rPr lang="en-GB" smtClean="0"/>
-              <a:t>05/04/2022</a:t>
+              <a:t>06/04/2022</a:t>
             </a:fld>
             <a:endParaRPr lang="en-GB"/>
           </a:p>
@@ -2097,7 +2097,7 @@
           <a:p>
             <a:fld id="{65735663-AB37-4784-894E-DAAE42030DBB}" type="datetimeFigureOut">
               <a:rPr lang="en-GB" smtClean="0"/>
-              <a:t>05/04/2022</a:t>
+              <a:t>06/04/2022</a:t>
             </a:fld>
             <a:endParaRPr lang="en-GB"/>
           </a:p>
@@ -2410,7 +2410,7 @@
           <a:p>
             <a:fld id="{65735663-AB37-4784-894E-DAAE42030DBB}" type="datetimeFigureOut">
               <a:rPr lang="en-GB" smtClean="0"/>
-              <a:t>05/04/2022</a:t>
+              <a:t>06/04/2022</a:t>
             </a:fld>
             <a:endParaRPr lang="en-GB"/>
           </a:p>
@@ -2699,7 +2699,7 @@
           <a:p>
             <a:fld id="{65735663-AB37-4784-894E-DAAE42030DBB}" type="datetimeFigureOut">
               <a:rPr lang="en-GB" smtClean="0"/>
-              <a:t>05/04/2022</a:t>
+              <a:t>06/04/2022</a:t>
             </a:fld>
             <a:endParaRPr lang="en-GB"/>
           </a:p>
@@ -2942,7 +2942,7 @@
           <a:p>
             <a:fld id="{65735663-AB37-4784-894E-DAAE42030DBB}" type="datetimeFigureOut">
               <a:rPr lang="en-GB" smtClean="0"/>
-              <a:t>05/04/2022</a:t>
+              <a:t>06/04/2022</a:t>
             </a:fld>
             <a:endParaRPr lang="en-GB"/>
           </a:p>
@@ -11277,8 +11277,8 @@
         </p:nvSpPr>
         <p:spPr>
           <a:xfrm>
-            <a:off x="318645" y="2013830"/>
-            <a:ext cx="2646228" cy="369332"/>
+            <a:off x="318644" y="2013830"/>
+            <a:ext cx="2867899" cy="369332"/>
           </a:xfrm>
           <a:prstGeom prst="rect">
             <a:avLst/>
@@ -11292,16 +11292,24 @@
           <a:lstStyle/>
           <a:p>
             <a:r>
+              <a:rPr lang="pl-PL" dirty="0" err="1"/>
+              <a:t>Welcome</a:t>
+            </a:r>
+            <a:r>
               <a:rPr lang="pl-PL" dirty="0"/>
-              <a:t>Hello </a:t>
+              <a:t> </a:t>
             </a:r>
             <a:r>
               <a:rPr lang="pl-PL" dirty="0" err="1"/>
-              <a:t>gall</a:t>
+              <a:t>anonymous</a:t>
             </a:r>
             <a:r>
               <a:rPr lang="pl-PL" dirty="0"/>
-              <a:t> anonim</a:t>
+              <a:t> </a:t>
+            </a:r>
+            <a:r>
+              <a:rPr lang="pl-PL" dirty="0" err="1"/>
+              <a:t>friend</a:t>
             </a:r>
             <a:endParaRPr lang="en-GB" dirty="0"/>
           </a:p>
@@ -12192,8 +12200,12 @@
           <a:lstStyle/>
           <a:p>
             <a:r>
+              <a:rPr lang="pl-PL" dirty="0" err="1"/>
+              <a:t>Welcome</a:t>
+            </a:r>
+            <a:r>
               <a:rPr lang="pl-PL" dirty="0"/>
-              <a:t>Hello </a:t>
+              <a:t> </a:t>
             </a:r>
             <a:r>
               <a:rPr lang="pl-PL" dirty="0" err="1"/>

</xml_diff>

<commit_message>
Most of basic gui elements implemented, Game Lobby owner view added, reading board to implement
</commit_message>
<xml_diff>
--- a/GanzShonClever_plan.pptx
+++ b/GanzShonClever_plan.pptx
@@ -275,7 +275,7 @@
           <a:p>
             <a:fld id="{65735663-AB37-4784-894E-DAAE42030DBB}" type="datetimeFigureOut">
               <a:rPr lang="en-GB" smtClean="0"/>
-              <a:t>07/04/2022</a:t>
+              <a:t>08/04/2022</a:t>
             </a:fld>
             <a:endParaRPr lang="en-GB"/>
           </a:p>
@@ -475,7 +475,7 @@
           <a:p>
             <a:fld id="{65735663-AB37-4784-894E-DAAE42030DBB}" type="datetimeFigureOut">
               <a:rPr lang="en-GB" smtClean="0"/>
-              <a:t>07/04/2022</a:t>
+              <a:t>08/04/2022</a:t>
             </a:fld>
             <a:endParaRPr lang="en-GB"/>
           </a:p>
@@ -685,7 +685,7 @@
           <a:p>
             <a:fld id="{65735663-AB37-4784-894E-DAAE42030DBB}" type="datetimeFigureOut">
               <a:rPr lang="en-GB" smtClean="0"/>
-              <a:t>07/04/2022</a:t>
+              <a:t>08/04/2022</a:t>
             </a:fld>
             <a:endParaRPr lang="en-GB"/>
           </a:p>
@@ -885,7 +885,7 @@
           <a:p>
             <a:fld id="{65735663-AB37-4784-894E-DAAE42030DBB}" type="datetimeFigureOut">
               <a:rPr lang="en-GB" smtClean="0"/>
-              <a:t>07/04/2022</a:t>
+              <a:t>08/04/2022</a:t>
             </a:fld>
             <a:endParaRPr lang="en-GB"/>
           </a:p>
@@ -1161,7 +1161,7 @@
           <a:p>
             <a:fld id="{65735663-AB37-4784-894E-DAAE42030DBB}" type="datetimeFigureOut">
               <a:rPr lang="en-GB" smtClean="0"/>
-              <a:t>07/04/2022</a:t>
+              <a:t>08/04/2022</a:t>
             </a:fld>
             <a:endParaRPr lang="en-GB"/>
           </a:p>
@@ -1429,7 +1429,7 @@
           <a:p>
             <a:fld id="{65735663-AB37-4784-894E-DAAE42030DBB}" type="datetimeFigureOut">
               <a:rPr lang="en-GB" smtClean="0"/>
-              <a:t>07/04/2022</a:t>
+              <a:t>08/04/2022</a:t>
             </a:fld>
             <a:endParaRPr lang="en-GB"/>
           </a:p>
@@ -1844,7 +1844,7 @@
           <a:p>
             <a:fld id="{65735663-AB37-4784-894E-DAAE42030DBB}" type="datetimeFigureOut">
               <a:rPr lang="en-GB" smtClean="0"/>
-              <a:t>07/04/2022</a:t>
+              <a:t>08/04/2022</a:t>
             </a:fld>
             <a:endParaRPr lang="en-GB"/>
           </a:p>
@@ -1986,7 +1986,7 @@
           <a:p>
             <a:fld id="{65735663-AB37-4784-894E-DAAE42030DBB}" type="datetimeFigureOut">
               <a:rPr lang="en-GB" smtClean="0"/>
-              <a:t>07/04/2022</a:t>
+              <a:t>08/04/2022</a:t>
             </a:fld>
             <a:endParaRPr lang="en-GB"/>
           </a:p>
@@ -2099,7 +2099,7 @@
           <a:p>
             <a:fld id="{65735663-AB37-4784-894E-DAAE42030DBB}" type="datetimeFigureOut">
               <a:rPr lang="en-GB" smtClean="0"/>
-              <a:t>07/04/2022</a:t>
+              <a:t>08/04/2022</a:t>
             </a:fld>
             <a:endParaRPr lang="en-GB"/>
           </a:p>
@@ -2412,7 +2412,7 @@
           <a:p>
             <a:fld id="{65735663-AB37-4784-894E-DAAE42030DBB}" type="datetimeFigureOut">
               <a:rPr lang="en-GB" smtClean="0"/>
-              <a:t>07/04/2022</a:t>
+              <a:t>08/04/2022</a:t>
             </a:fld>
             <a:endParaRPr lang="en-GB"/>
           </a:p>
@@ -2701,7 +2701,7 @@
           <a:p>
             <a:fld id="{65735663-AB37-4784-894E-DAAE42030DBB}" type="datetimeFigureOut">
               <a:rPr lang="en-GB" smtClean="0"/>
-              <a:t>07/04/2022</a:t>
+              <a:t>08/04/2022</a:t>
             </a:fld>
             <a:endParaRPr lang="en-GB"/>
           </a:p>
@@ -2944,7 +2944,7 @@
           <a:p>
             <a:fld id="{65735663-AB37-4784-894E-DAAE42030DBB}" type="datetimeFigureOut">
               <a:rPr lang="en-GB" smtClean="0"/>
-              <a:t>07/04/2022</a:t>
+              <a:t>08/04/2022</a:t>
             </a:fld>
             <a:endParaRPr lang="en-GB"/>
           </a:p>
@@ -5936,7 +5936,7 @@
         </p:nvSpPr>
         <p:spPr>
           <a:xfrm>
-            <a:off x="6087079" y="2661546"/>
+            <a:off x="6164953" y="2655726"/>
             <a:ext cx="2334590" cy="369332"/>
           </a:xfrm>
           <a:prstGeom prst="rect">
@@ -6298,7 +6298,7 @@
         </p:nvSpPr>
         <p:spPr>
           <a:xfrm>
-            <a:off x="6164953" y="3452195"/>
+            <a:off x="5576344" y="3456070"/>
             <a:ext cx="3371820" cy="584775"/>
           </a:xfrm>
           <a:prstGeom prst="rect">
@@ -7225,7 +7225,7 @@
           <a:p>
             <a:pPr algn="ctr"/>
             <a:r>
-              <a:rPr lang="pl-PL" sz="4000" b="1"/>
+              <a:rPr lang="pl-PL" sz="4000" b="1" dirty="0"/>
               <a:t>Game page</a:t>
             </a:r>
             <a:endParaRPr lang="en-GB" sz="4000" b="1" dirty="0"/>
@@ -12682,7 +12682,7 @@
         <p:spPr>
           <a:xfrm>
             <a:off x="838200" y="1825624"/>
-            <a:ext cx="11353800" cy="5032375"/>
+            <a:ext cx="8551460" cy="3128513"/>
           </a:xfrm>
         </p:spPr>
         <p:txBody>
@@ -12690,247 +12690,403 @@
           <a:lstStyle/>
           <a:p>
             <a:r>
-              <a:rPr lang="pl-PL" sz="2400" dirty="0" err="1"/>
+              <a:rPr lang="pl-PL" sz="1800" dirty="0" err="1"/>
               <a:t>JPasswordField</a:t>
             </a:r>
             <a:r>
-              <a:rPr lang="pl-PL" sz="2400" dirty="0"/>
+              <a:rPr lang="pl-PL" sz="1800" dirty="0"/>
               <a:t> for : password</a:t>
             </a:r>
           </a:p>
           <a:p>
             <a:r>
-              <a:rPr lang="pl-PL" sz="2400" dirty="0" err="1"/>
+              <a:rPr lang="pl-PL" sz="1800" dirty="0" err="1"/>
               <a:t>Jtable</a:t>
             </a:r>
             <a:r>
-              <a:rPr lang="pl-PL" sz="2400" dirty="0"/>
+              <a:rPr lang="pl-PL" sz="1800" dirty="0"/>
               <a:t> for : Profile and </a:t>
             </a:r>
             <a:r>
-              <a:rPr lang="pl-PL" sz="2400" dirty="0" err="1"/>
+              <a:rPr lang="pl-PL" sz="1800" dirty="0" err="1"/>
               <a:t>game</a:t>
             </a:r>
             <a:r>
-              <a:rPr lang="pl-PL" sz="2400" dirty="0"/>
+              <a:rPr lang="pl-PL" sz="1800" dirty="0"/>
               <a:t> info, </a:t>
             </a:r>
             <a:r>
-              <a:rPr lang="pl-PL" sz="2400" dirty="0" err="1"/>
+              <a:rPr lang="pl-PL" sz="1800" dirty="0" err="1"/>
               <a:t>Players</a:t>
             </a:r>
             <a:r>
-              <a:rPr lang="pl-PL" sz="2400" dirty="0"/>
+              <a:rPr lang="pl-PL" sz="1800" dirty="0"/>
               <a:t> in lobby, </a:t>
             </a:r>
             <a:r>
-              <a:rPr lang="pl-PL" sz="2400" dirty="0" err="1"/>
+              <a:rPr lang="pl-PL" sz="1800" dirty="0" err="1"/>
               <a:t>games</a:t>
             </a:r>
             <a:r>
-              <a:rPr lang="pl-PL" sz="2400" dirty="0"/>
+              <a:rPr lang="pl-PL" sz="1800" dirty="0"/>
               <a:t> in </a:t>
             </a:r>
             <a:r>
-              <a:rPr lang="pl-PL" sz="2400" dirty="0" err="1"/>
+              <a:rPr lang="pl-PL" sz="1800" dirty="0" err="1"/>
               <a:t>join</a:t>
             </a:r>
             <a:r>
-              <a:rPr lang="pl-PL" sz="2400" dirty="0"/>
+              <a:rPr lang="pl-PL" sz="1800" dirty="0"/>
               <a:t> </a:t>
             </a:r>
             <a:r>
-              <a:rPr lang="pl-PL" sz="2400" dirty="0" err="1"/>
+              <a:rPr lang="pl-PL" sz="1800" dirty="0" err="1"/>
               <a:t>game</a:t>
             </a:r>
-            <a:endParaRPr lang="pl-PL" sz="2400" dirty="0"/>
-          </a:p>
-          <a:p>
-            <a:r>
-              <a:rPr lang="pl-PL" sz="2400" dirty="0" err="1"/>
+            <a:endParaRPr lang="pl-PL" sz="1800" dirty="0"/>
+          </a:p>
+          <a:p>
+            <a:r>
+              <a:rPr lang="pl-PL" sz="1800" dirty="0" err="1"/>
               <a:t>JComboBox</a:t>
             </a:r>
             <a:r>
-              <a:rPr lang="pl-PL" sz="2400" dirty="0"/>
+              <a:rPr lang="pl-PL" sz="1800" dirty="0"/>
               <a:t> for : </a:t>
             </a:r>
             <a:r>
-              <a:rPr lang="pl-PL" sz="2400" dirty="0" err="1"/>
+              <a:rPr lang="pl-PL" sz="1800" dirty="0" err="1"/>
               <a:t>choose</a:t>
             </a:r>
             <a:r>
-              <a:rPr lang="pl-PL" sz="2400" dirty="0"/>
+              <a:rPr lang="pl-PL" sz="1800" dirty="0"/>
               <a:t> </a:t>
             </a:r>
             <a:r>
-              <a:rPr lang="pl-PL" sz="2400" dirty="0" err="1"/>
+              <a:rPr lang="pl-PL" sz="1800" dirty="0" err="1"/>
               <a:t>option</a:t>
             </a:r>
             <a:r>
-              <a:rPr lang="pl-PL" sz="2400" dirty="0"/>
+              <a:rPr lang="pl-PL" sz="1800" dirty="0"/>
               <a:t> from </a:t>
             </a:r>
             <a:r>
-              <a:rPr lang="pl-PL" sz="2400" dirty="0" err="1"/>
+              <a:rPr lang="pl-PL" sz="1800" dirty="0" err="1"/>
               <a:t>availables</a:t>
             </a:r>
-            <a:endParaRPr lang="pl-PL" sz="2400" dirty="0"/>
-          </a:p>
-          <a:p>
-            <a:r>
-              <a:rPr lang="pl-PL" sz="2400" dirty="0" err="1"/>
+            <a:endParaRPr lang="pl-PL" sz="1800" dirty="0"/>
+          </a:p>
+          <a:p>
+            <a:r>
+              <a:rPr lang="pl-PL" sz="1800" dirty="0" err="1"/>
               <a:t>JCheckBox</a:t>
             </a:r>
             <a:r>
-              <a:rPr lang="pl-PL" sz="2400" dirty="0"/>
+              <a:rPr lang="pl-PL" sz="1800" dirty="0"/>
               <a:t> for : </a:t>
             </a:r>
             <a:r>
-              <a:rPr lang="pl-PL" sz="2400" dirty="0" err="1"/>
+              <a:rPr lang="pl-PL" sz="1800" dirty="0" err="1"/>
               <a:t>agreement</a:t>
             </a:r>
             <a:r>
-              <a:rPr lang="pl-PL" sz="2400" dirty="0"/>
+              <a:rPr lang="pl-PL" sz="1800" dirty="0"/>
               <a:t> </a:t>
             </a:r>
             <a:r>
-              <a:rPr lang="pl-PL" sz="2400" dirty="0" err="1"/>
+              <a:rPr lang="pl-PL" sz="1800" dirty="0" err="1"/>
               <a:t>etc</a:t>
             </a:r>
-            <a:endParaRPr lang="pl-PL" sz="2400" dirty="0"/>
-          </a:p>
-          <a:p>
-            <a:r>
-              <a:rPr lang="pl-PL" sz="2400" dirty="0" err="1"/>
+            <a:endParaRPr lang="pl-PL" sz="1800" dirty="0"/>
+          </a:p>
+          <a:p>
+            <a:r>
+              <a:rPr lang="pl-PL" sz="1800" dirty="0" err="1"/>
               <a:t>JScrollPane</a:t>
             </a:r>
             <a:r>
-              <a:rPr lang="pl-PL" sz="2400" dirty="0"/>
+              <a:rPr lang="pl-PL" sz="1800" dirty="0"/>
               <a:t> for : </a:t>
             </a:r>
             <a:r>
-              <a:rPr lang="pl-PL" sz="2400" dirty="0" err="1"/>
+              <a:rPr lang="pl-PL" sz="1800" dirty="0" err="1"/>
               <a:t>games</a:t>
             </a:r>
             <a:r>
-              <a:rPr lang="pl-PL" sz="2400" dirty="0"/>
+              <a:rPr lang="pl-PL" sz="1800" dirty="0"/>
               <a:t> requests, </a:t>
             </a:r>
             <a:r>
-              <a:rPr lang="pl-PL" sz="2400" dirty="0" err="1"/>
+              <a:rPr lang="pl-PL" sz="1800" dirty="0" err="1"/>
               <a:t>friends</a:t>
             </a:r>
             <a:r>
-              <a:rPr lang="pl-PL" sz="2400" dirty="0"/>
+              <a:rPr lang="pl-PL" sz="1800" dirty="0"/>
               <a:t> requests, </a:t>
             </a:r>
             <a:r>
-              <a:rPr lang="pl-PL" sz="2400" dirty="0" err="1"/>
+              <a:rPr lang="pl-PL" sz="1800" dirty="0" err="1"/>
               <a:t>join</a:t>
             </a:r>
             <a:r>
-              <a:rPr lang="pl-PL" sz="2400" dirty="0"/>
+              <a:rPr lang="pl-PL" sz="1800" dirty="0"/>
               <a:t> </a:t>
             </a:r>
             <a:r>
-              <a:rPr lang="pl-PL" sz="2400" dirty="0" err="1"/>
+              <a:rPr lang="pl-PL" sz="1800" dirty="0" err="1"/>
               <a:t>game</a:t>
             </a:r>
             <a:r>
-              <a:rPr lang="pl-PL" sz="2400" dirty="0"/>
+              <a:rPr lang="pl-PL" sz="1800" dirty="0"/>
               <a:t> list, </a:t>
             </a:r>
             <a:r>
-              <a:rPr lang="pl-PL" sz="2400" dirty="0" err="1"/>
+              <a:rPr lang="pl-PL" sz="1800" dirty="0" err="1"/>
               <a:t>invite</a:t>
             </a:r>
             <a:r>
-              <a:rPr lang="pl-PL" sz="2400" dirty="0"/>
+              <a:rPr lang="pl-PL" sz="1800" dirty="0"/>
               <a:t> </a:t>
             </a:r>
             <a:r>
-              <a:rPr lang="pl-PL" sz="2400" dirty="0" err="1"/>
+              <a:rPr lang="pl-PL" sz="1800" dirty="0" err="1"/>
               <a:t>friend</a:t>
             </a:r>
             <a:r>
-              <a:rPr lang="pl-PL" sz="2400" dirty="0"/>
+              <a:rPr lang="pl-PL" sz="1800" dirty="0"/>
               <a:t> list</a:t>
             </a:r>
           </a:p>
           <a:p>
             <a:r>
-              <a:rPr lang="pl-PL" sz="2400" dirty="0" err="1"/>
+              <a:rPr lang="pl-PL" sz="1800" dirty="0" err="1"/>
               <a:t>JScrollBar</a:t>
             </a:r>
             <a:r>
-              <a:rPr lang="pl-PL" sz="2400" dirty="0"/>
+              <a:rPr lang="pl-PL" sz="1800" dirty="0"/>
               <a:t> for : ..</a:t>
             </a:r>
           </a:p>
           <a:p>
             <a:r>
-              <a:rPr lang="pl-PL" sz="2400" dirty="0" err="1"/>
+              <a:rPr lang="pl-PL" sz="1800" dirty="0" err="1"/>
               <a:t>JOptionPane</a:t>
             </a:r>
             <a:r>
-              <a:rPr lang="pl-PL" sz="2400" dirty="0"/>
+              <a:rPr lang="pl-PL" sz="1800" dirty="0"/>
               <a:t> for : </a:t>
             </a:r>
             <a:r>
-              <a:rPr lang="pl-PL" sz="2400" dirty="0" err="1"/>
+              <a:rPr lang="pl-PL" sz="1800" dirty="0" err="1"/>
               <a:t>enter</a:t>
             </a:r>
             <a:r>
-              <a:rPr lang="pl-PL" sz="2400" dirty="0"/>
+              <a:rPr lang="pl-PL" sz="1800" dirty="0"/>
               <a:t> pass in </a:t>
             </a:r>
             <a:r>
-              <a:rPr lang="pl-PL" sz="2400" dirty="0" err="1"/>
+              <a:rPr lang="pl-PL" sz="1800" dirty="0" err="1"/>
               <a:t>join</a:t>
             </a:r>
             <a:r>
-              <a:rPr lang="pl-PL" sz="2400" dirty="0"/>
+              <a:rPr lang="pl-PL" sz="1800" dirty="0"/>
               <a:t> </a:t>
             </a:r>
             <a:r>
-              <a:rPr lang="pl-PL" sz="2400" dirty="0" err="1"/>
+              <a:rPr lang="pl-PL" sz="1800" dirty="0" err="1"/>
               <a:t>game</a:t>
             </a:r>
             <a:r>
-              <a:rPr lang="pl-PL" sz="2400" dirty="0"/>
+              <a:rPr lang="pl-PL" sz="1800" dirty="0"/>
               <a:t>, reset password, „</a:t>
             </a:r>
             <a:r>
-              <a:rPr lang="pl-PL" sz="2400" dirty="0" err="1"/>
+              <a:rPr lang="pl-PL" sz="1800" dirty="0" err="1"/>
               <a:t>are</a:t>
             </a:r>
             <a:r>
-              <a:rPr lang="pl-PL" sz="2400" dirty="0"/>
+              <a:rPr lang="pl-PL" sz="1800" dirty="0"/>
               <a:t> </a:t>
             </a:r>
             <a:r>
-              <a:rPr lang="pl-PL" sz="2400" dirty="0" err="1"/>
+              <a:rPr lang="pl-PL" sz="1800" dirty="0" err="1"/>
               <a:t>you</a:t>
             </a:r>
             <a:r>
-              <a:rPr lang="pl-PL" sz="2400" dirty="0"/>
+              <a:rPr lang="pl-PL" sz="1800" dirty="0"/>
               <a:t> </a:t>
             </a:r>
             <a:r>
-              <a:rPr lang="pl-PL" sz="2400" dirty="0" err="1"/>
+              <a:rPr lang="pl-PL" sz="1800" dirty="0" err="1"/>
               <a:t>sure</a:t>
             </a:r>
             <a:r>
-              <a:rPr lang="pl-PL" sz="2400" dirty="0"/>
+              <a:rPr lang="pl-PL" sz="1800" dirty="0"/>
               <a:t>” </a:t>
             </a:r>
             <a:r>
-              <a:rPr lang="pl-PL" sz="2400" dirty="0" err="1"/>
+              <a:rPr lang="pl-PL" sz="1800" dirty="0" err="1"/>
               <a:t>boxes</a:t>
             </a:r>
-            <a:endParaRPr lang="pl-PL" sz="2400" dirty="0"/>
-          </a:p>
-          <a:p>
+            <a:endParaRPr lang="pl-PL" sz="1800" dirty="0"/>
+          </a:p>
+          <a:p>
+            <a:endParaRPr lang="en-GB" dirty="0"/>
+          </a:p>
+        </p:txBody>
+      </p:sp>
+      <p:sp>
+        <p:nvSpPr>
+          <p:cNvPr id="4" name="pole tekstowe 3">
+            <a:extLst>
+              <a:ext uri="{FF2B5EF4-FFF2-40B4-BE49-F238E27FC236}">
+                <a16:creationId xmlns:a16="http://schemas.microsoft.com/office/drawing/2014/main" id="{CDEBBC72-9488-497E-A4F2-ABE76F3E4198}"/>
+              </a:ext>
+            </a:extLst>
+          </p:cNvPr>
+          <p:cNvSpPr txBox="1"/>
+          <p:nvPr/>
+        </p:nvSpPr>
+        <p:spPr>
+          <a:xfrm>
+            <a:off x="838200" y="5377218"/>
+            <a:ext cx="10243782" cy="646331"/>
+          </a:xfrm>
+          <a:prstGeom prst="rect">
+            <a:avLst/>
+          </a:prstGeom>
+          <a:noFill/>
+        </p:spPr>
+        <p:txBody>
+          <a:bodyPr wrap="square" rtlCol="0">
+            <a:spAutoFit/>
+          </a:bodyPr>
+          <a:lstStyle/>
+          <a:p>
+            <a:r>
+              <a:rPr lang="pl-PL" dirty="0"/>
+              <a:t>Next to do : </a:t>
+            </a:r>
+            <a:r>
+              <a:rPr lang="pl-PL" dirty="0" err="1"/>
+              <a:t>user</a:t>
+            </a:r>
+            <a:r>
+              <a:rPr lang="pl-PL" dirty="0"/>
+              <a:t> </a:t>
+            </a:r>
+            <a:r>
+              <a:rPr lang="pl-PL" dirty="0" err="1"/>
+              <a:t>class</a:t>
+            </a:r>
+            <a:r>
+              <a:rPr lang="pl-PL" dirty="0"/>
+              <a:t> -&gt; </a:t>
+            </a:r>
+            <a:r>
+              <a:rPr lang="pl-PL" dirty="0" err="1"/>
+              <a:t>logging</a:t>
+            </a:r>
+            <a:r>
+              <a:rPr lang="pl-PL" dirty="0"/>
+              <a:t> with </a:t>
+            </a:r>
+            <a:r>
+              <a:rPr lang="pl-PL" dirty="0" err="1"/>
+              <a:t>Jpassword</a:t>
+            </a:r>
+            <a:r>
+              <a:rPr lang="pl-PL" dirty="0"/>
+              <a:t> (</a:t>
+            </a:r>
+            <a:r>
+              <a:rPr lang="pl-PL" dirty="0" err="1"/>
+              <a:t>xml</a:t>
+            </a:r>
+            <a:r>
+              <a:rPr lang="pl-PL" dirty="0"/>
+              <a:t> test </a:t>
+            </a:r>
+            <a:r>
+              <a:rPr lang="pl-PL" dirty="0" err="1"/>
+              <a:t>database</a:t>
+            </a:r>
+            <a:r>
+              <a:rPr lang="pl-PL" dirty="0"/>
+              <a:t>) -&gt;  </a:t>
+            </a:r>
+            <a:r>
+              <a:rPr lang="pl-PL" dirty="0" err="1"/>
+              <a:t>game</a:t>
+            </a:r>
+            <a:r>
+              <a:rPr lang="pl-PL" dirty="0"/>
+              <a:t> page </a:t>
+            </a:r>
+            <a:r>
+              <a:rPr lang="pl-PL" dirty="0" err="1"/>
+              <a:t>view</a:t>
+            </a:r>
+            <a:r>
+              <a:rPr lang="pl-PL" dirty="0"/>
+              <a:t>(</a:t>
+            </a:r>
+            <a:r>
+              <a:rPr lang="pl-PL" dirty="0" err="1"/>
+              <a:t>reading</a:t>
+            </a:r>
+            <a:r>
+              <a:rPr lang="pl-PL" dirty="0"/>
+              <a:t> </a:t>
+            </a:r>
+            <a:r>
+              <a:rPr lang="pl-PL" dirty="0" err="1"/>
+              <a:t>board</a:t>
+            </a:r>
+            <a:r>
+              <a:rPr lang="pl-PL" dirty="0"/>
+              <a:t> </a:t>
+            </a:r>
+            <a:r>
+              <a:rPr lang="pl-PL" dirty="0" err="1"/>
+              <a:t>etc</a:t>
+            </a:r>
+            <a:r>
+              <a:rPr lang="pl-PL" dirty="0"/>
+              <a:t>) -&gt; single </a:t>
+            </a:r>
+            <a:r>
+              <a:rPr lang="pl-PL" dirty="0" err="1"/>
+              <a:t>player</a:t>
+            </a:r>
+            <a:r>
+              <a:rPr lang="pl-PL" dirty="0"/>
+              <a:t> </a:t>
+            </a:r>
+            <a:r>
+              <a:rPr lang="pl-PL" dirty="0" err="1"/>
+              <a:t>mode</a:t>
+            </a:r>
+            <a:r>
+              <a:rPr lang="pl-PL" dirty="0"/>
+              <a:t>(server -&gt; </a:t>
+            </a:r>
+            <a:r>
+              <a:rPr lang="pl-PL" dirty="0" err="1"/>
+              <a:t>client</a:t>
+            </a:r>
+            <a:r>
+              <a:rPr lang="pl-PL" dirty="0"/>
+              <a:t> </a:t>
+            </a:r>
+            <a:r>
+              <a:rPr lang="pl-PL" dirty="0" err="1"/>
+              <a:t>communication</a:t>
+            </a:r>
+            <a:r>
+              <a:rPr lang="pl-PL" dirty="0"/>
+              <a:t>) </a:t>
+            </a:r>
             <a:endParaRPr lang="en-GB" dirty="0"/>
           </a:p>
         </p:txBody>

</xml_diff>